<commit_message>
updated the ppt while waiting for SLP LPS
</commit_message>
<xml_diff>
--- a/SLP github.pptx
+++ b/SLP github.pptx
@@ -15,6 +15,8 @@
     <p:sldId id="263" r:id="rId9"/>
     <p:sldId id="264" r:id="rId10"/>
     <p:sldId id="265" r:id="rId11"/>
+    <p:sldId id="266" r:id="rId12"/>
+    <p:sldId id="267" r:id="rId13"/>
   </p:sldIdLst>
   <p:sldSz cx="9144000" cy="6858000" type="screen4x3"/>
   <p:notesSz cx="6858000" cy="9144000"/>
@@ -3236,12 +3238,19 @@
             </a:r>
             <a:r>
               <a:rPr lang="en-US" dirty="0" smtClean="0"/>
-              <a:t> knows </a:t>
-            </a:r>
-            <a:r>
-              <a:rPr lang="en-US" smtClean="0"/>
-              <a:t>stuff changed. </a:t>
-            </a:r>
+              <a:t> knows stuff changed. </a:t>
+            </a:r>
+          </a:p>
+          <a:p>
+            <a:r>
+              <a:rPr lang="en-US" dirty="0" smtClean="0"/>
+              <a:t>You can go back to a commit. If you broke something, you can go back in time and see where/how you broke it. </a:t>
+            </a:r>
+          </a:p>
+          <a:p>
+            <a:pPr marL="0" indent="0">
+              <a:buNone/>
+            </a:pPr>
             <a:endParaRPr lang="en-US" dirty="0" smtClean="0"/>
           </a:p>
         </p:txBody>
@@ -3250,6 +3259,278 @@
     <p:extLst>
       <p:ext uri="{BB962C8B-B14F-4D97-AF65-F5344CB8AC3E}">
         <p14:creationId xmlns:p14="http://schemas.microsoft.com/office/powerpoint/2010/main" val="4084723148"/>
+      </p:ext>
+    </p:extLst>
+  </p:cSld>
+  <p:clrMapOvr>
+    <a:masterClrMapping/>
+  </p:clrMapOvr>
+</p:sld>
+</file>
+
+<file path=ppt/slides/slide11.xml><?xml version="1.0" encoding="utf-8"?>
+<p:sld xmlns:a="http://schemas.openxmlformats.org/drawingml/2006/main" xmlns:r="http://schemas.openxmlformats.org/officeDocument/2006/relationships" xmlns:p="http://schemas.openxmlformats.org/presentationml/2006/main">
+  <p:cSld>
+    <p:spTree>
+      <p:nvGrpSpPr>
+        <p:cNvPr id="1" name=""/>
+        <p:cNvGrpSpPr/>
+        <p:nvPr/>
+      </p:nvGrpSpPr>
+      <p:grpSpPr>
+        <a:xfrm>
+          <a:off x="0" y="0"/>
+          <a:ext cx="0" cy="0"/>
+          <a:chOff x="0" y="0"/>
+          <a:chExt cx="0" cy="0"/>
+        </a:xfrm>
+      </p:grpSpPr>
+      <p:sp>
+        <p:nvSpPr>
+          <p:cNvPr id="2" name="Title 1"/>
+          <p:cNvSpPr>
+            <a:spLocks noGrp="1"/>
+          </p:cNvSpPr>
+          <p:nvPr>
+            <p:ph type="title"/>
+          </p:nvPr>
+        </p:nvSpPr>
+        <p:spPr/>
+        <p:txBody>
+          <a:bodyPr/>
+          <a:lstStyle/>
+          <a:p>
+            <a:r>
+              <a:rPr lang="en-US" dirty="0" err="1" smtClean="0"/>
+              <a:t>Git</a:t>
+            </a:r>
+            <a:r>
+              <a:rPr lang="en-US" dirty="0" smtClean="0"/>
+              <a:t> push</a:t>
+            </a:r>
+            <a:endParaRPr lang="en-US" dirty="0"/>
+          </a:p>
+        </p:txBody>
+      </p:sp>
+      <p:sp>
+        <p:nvSpPr>
+          <p:cNvPr id="3" name="Content Placeholder 2"/>
+          <p:cNvSpPr>
+            <a:spLocks noGrp="1"/>
+          </p:cNvSpPr>
+          <p:nvPr>
+            <p:ph idx="1"/>
+          </p:nvPr>
+        </p:nvSpPr>
+        <p:spPr/>
+        <p:txBody>
+          <a:bodyPr>
+            <a:normAutofit fontScale="92500" lnSpcReduction="20000"/>
+          </a:bodyPr>
+          <a:lstStyle/>
+          <a:p>
+            <a:r>
+              <a:rPr lang="en-US" dirty="0" smtClean="0"/>
+              <a:t>A “push” is when you take a copy of what’s on your computer, and “push” it to </a:t>
+            </a:r>
+            <a:r>
+              <a:rPr lang="en-US" dirty="0" err="1" smtClean="0"/>
+              <a:t>github.com</a:t>
+            </a:r>
+            <a:r>
+              <a:rPr lang="en-US" dirty="0" smtClean="0"/>
+              <a:t>.</a:t>
+            </a:r>
+          </a:p>
+          <a:p>
+            <a:r>
+              <a:rPr lang="en-US" dirty="0" smtClean="0"/>
+              <a:t>Why? So everyone else on your team can see what you did. Example:</a:t>
+            </a:r>
+          </a:p>
+          <a:p>
+            <a:pPr marL="0" indent="0">
+              <a:buNone/>
+            </a:pPr>
+            <a:r>
+              <a:rPr lang="en-US" dirty="0" smtClean="0"/>
+              <a:t>Keith makes edits to </a:t>
+            </a:r>
+            <a:r>
+              <a:rPr lang="en-US" dirty="0" err="1" smtClean="0"/>
+              <a:t>hello.txt</a:t>
+            </a:r>
+            <a:endParaRPr lang="en-US" dirty="0" smtClean="0"/>
+          </a:p>
+          <a:p>
+            <a:pPr marL="0" indent="0">
+              <a:buNone/>
+            </a:pPr>
+            <a:r>
+              <a:rPr lang="en-US" dirty="0" smtClean="0"/>
+              <a:t>Claire also makes her own edits to </a:t>
+            </a:r>
+            <a:r>
+              <a:rPr lang="en-US" dirty="0" err="1" smtClean="0"/>
+              <a:t>hello.txt</a:t>
+            </a:r>
+            <a:endParaRPr lang="en-US" dirty="0" smtClean="0"/>
+          </a:p>
+          <a:p>
+            <a:pPr marL="0" indent="0">
+              <a:buNone/>
+            </a:pPr>
+            <a:r>
+              <a:rPr lang="en-US" dirty="0" smtClean="0"/>
+              <a:t>Ryan comes in, and adds his own stuff to </a:t>
+            </a:r>
+            <a:r>
+              <a:rPr lang="en-US" dirty="0" err="1" smtClean="0"/>
+              <a:t>hello.txt</a:t>
+            </a:r>
+            <a:endParaRPr lang="en-US" dirty="0" smtClean="0"/>
+          </a:p>
+          <a:p>
+            <a:pPr marL="0" indent="0">
+              <a:buNone/>
+            </a:pPr>
+            <a:r>
+              <a:rPr lang="en-US" dirty="0" smtClean="0"/>
+              <a:t>Now what? Github knows when/where each person made changes and manages them so they work well</a:t>
+            </a:r>
+          </a:p>
+          <a:p>
+            <a:pPr marL="0" indent="0">
+              <a:buNone/>
+            </a:pPr>
+            <a:endParaRPr lang="en-US" dirty="0"/>
+          </a:p>
+        </p:txBody>
+      </p:sp>
+    </p:spTree>
+    <p:extLst>
+      <p:ext uri="{BB962C8B-B14F-4D97-AF65-F5344CB8AC3E}">
+        <p14:creationId xmlns:p14="http://schemas.microsoft.com/office/powerpoint/2010/main" val="1360688489"/>
+      </p:ext>
+    </p:extLst>
+  </p:cSld>
+  <p:clrMapOvr>
+    <a:masterClrMapping/>
+  </p:clrMapOvr>
+</p:sld>
+</file>
+
+<file path=ppt/slides/slide12.xml><?xml version="1.0" encoding="utf-8"?>
+<p:sld xmlns:a="http://schemas.openxmlformats.org/drawingml/2006/main" xmlns:r="http://schemas.openxmlformats.org/officeDocument/2006/relationships" xmlns:p="http://schemas.openxmlformats.org/presentationml/2006/main">
+  <p:cSld>
+    <p:spTree>
+      <p:nvGrpSpPr>
+        <p:cNvPr id="1" name=""/>
+        <p:cNvGrpSpPr/>
+        <p:nvPr/>
+      </p:nvGrpSpPr>
+      <p:grpSpPr>
+        <a:xfrm>
+          <a:off x="0" y="0"/>
+          <a:ext cx="0" cy="0"/>
+          <a:chOff x="0" y="0"/>
+          <a:chExt cx="0" cy="0"/>
+        </a:xfrm>
+      </p:grpSpPr>
+      <p:sp>
+        <p:nvSpPr>
+          <p:cNvPr id="2" name="Title 1"/>
+          <p:cNvSpPr>
+            <a:spLocks noGrp="1"/>
+          </p:cNvSpPr>
+          <p:nvPr>
+            <p:ph type="title"/>
+          </p:nvPr>
+        </p:nvSpPr>
+        <p:spPr/>
+        <p:txBody>
+          <a:bodyPr/>
+          <a:lstStyle/>
+          <a:p>
+            <a:r>
+              <a:rPr lang="en-US" dirty="0" err="1" smtClean="0"/>
+              <a:t>Git</a:t>
+            </a:r>
+            <a:r>
+              <a:rPr lang="en-US" dirty="0" smtClean="0"/>
+              <a:t> branch</a:t>
+            </a:r>
+            <a:endParaRPr lang="en-US" dirty="0"/>
+          </a:p>
+        </p:txBody>
+      </p:sp>
+      <p:sp>
+        <p:nvSpPr>
+          <p:cNvPr id="3" name="Content Placeholder 2"/>
+          <p:cNvSpPr>
+            <a:spLocks noGrp="1"/>
+          </p:cNvSpPr>
+          <p:nvPr>
+            <p:ph idx="1"/>
+          </p:nvPr>
+        </p:nvSpPr>
+        <p:spPr>
+          <a:xfrm>
+            <a:off x="304800" y="1600200"/>
+            <a:ext cx="8382000" cy="1583267"/>
+          </a:xfrm>
+        </p:spPr>
+        <p:txBody>
+          <a:bodyPr/>
+          <a:lstStyle/>
+          <a:p>
+            <a:pPr marL="0" indent="0">
+              <a:buNone/>
+            </a:pPr>
+            <a:r>
+              <a:rPr lang="en-US" dirty="0" smtClean="0"/>
+              <a:t>Branches are similar to the previous concepts.</a:t>
+            </a:r>
+          </a:p>
+          <a:p>
+            <a:pPr marL="0" indent="0">
+              <a:buNone/>
+            </a:pPr>
+            <a:r>
+              <a:rPr lang="en-US" dirty="0" smtClean="0"/>
+              <a:t>Why you branch?</a:t>
+            </a:r>
+          </a:p>
+        </p:txBody>
+      </p:sp>
+      <p:pic>
+        <p:nvPicPr>
+          <p:cNvPr id="4" name="Picture 3"/>
+          <p:cNvPicPr>
+            <a:picLocks noChangeAspect="1"/>
+          </p:cNvPicPr>
+          <p:nvPr/>
+        </p:nvPicPr>
+        <p:blipFill>
+          <a:blip r:embed="rId2"/>
+          <a:stretch>
+            <a:fillRect/>
+          </a:stretch>
+        </p:blipFill>
+        <p:spPr>
+          <a:xfrm>
+            <a:off x="1333500" y="2849034"/>
+            <a:ext cx="6464300" cy="3721100"/>
+          </a:xfrm>
+          <a:prstGeom prst="rect">
+            <a:avLst/>
+          </a:prstGeom>
+        </p:spPr>
+      </p:pic>
+    </p:spTree>
+    <p:extLst>
+      <p:ext uri="{BB962C8B-B14F-4D97-AF65-F5344CB8AC3E}">
+        <p14:creationId xmlns:p14="http://schemas.microsoft.com/office/powerpoint/2010/main" val="1979409863"/>
       </p:ext>
     </p:extLst>
   </p:cSld>

</xml_diff>

<commit_message>
I added more stuff
</commit_message>
<xml_diff>
--- a/SLP github.pptx
+++ b/SLP github.pptx
@@ -11,18 +11,19 @@
     <p:sldId id="259" r:id="rId5"/>
     <p:sldId id="269" r:id="rId6"/>
     <p:sldId id="260" r:id="rId7"/>
-    <p:sldId id="261" r:id="rId8"/>
-    <p:sldId id="272" r:id="rId9"/>
-    <p:sldId id="262" r:id="rId10"/>
-    <p:sldId id="275" r:id="rId11"/>
-    <p:sldId id="263" r:id="rId12"/>
-    <p:sldId id="264" r:id="rId13"/>
-    <p:sldId id="265" r:id="rId14"/>
-    <p:sldId id="271" r:id="rId15"/>
-    <p:sldId id="266" r:id="rId16"/>
-    <p:sldId id="267" r:id="rId17"/>
-    <p:sldId id="273" r:id="rId18"/>
-    <p:sldId id="274" r:id="rId19"/>
+    <p:sldId id="272" r:id="rId8"/>
+    <p:sldId id="262" r:id="rId9"/>
+    <p:sldId id="275" r:id="rId10"/>
+    <p:sldId id="263" r:id="rId11"/>
+    <p:sldId id="264" r:id="rId12"/>
+    <p:sldId id="265" r:id="rId13"/>
+    <p:sldId id="271" r:id="rId14"/>
+    <p:sldId id="266" r:id="rId15"/>
+    <p:sldId id="267" r:id="rId16"/>
+    <p:sldId id="273" r:id="rId17"/>
+    <p:sldId id="274" r:id="rId18"/>
+    <p:sldId id="277" r:id="rId19"/>
+    <p:sldId id="276" r:id="rId20"/>
   </p:sldIdLst>
   <p:sldSz cx="9144000" cy="6858000" type="screen4x3"/>
   <p:notesSz cx="6858000" cy="9144000"/>
@@ -3159,7 +3160,9 @@
           </a:xfrm>
         </p:spPr>
         <p:txBody>
-          <a:bodyPr/>
+          <a:bodyPr>
+            <a:normAutofit/>
+          </a:bodyPr>
           <a:lstStyle/>
           <a:p>
             <a:r>
@@ -3174,7 +3177,50 @@
               <a:rPr lang="en-US" dirty="0" smtClean="0"/>
               <a:t>? </a:t>
             </a:r>
+            <a:br>
+              <a:rPr lang="en-US" dirty="0" smtClean="0"/>
+            </a:br>
             <a:endParaRPr lang="en-US" dirty="0"/>
+          </a:p>
+        </p:txBody>
+      </p:sp>
+      <p:sp>
+        <p:nvSpPr>
+          <p:cNvPr id="3" name="TextBox 2"/>
+          <p:cNvSpPr txBox="1"/>
+          <p:nvPr/>
+        </p:nvSpPr>
+        <p:spPr>
+          <a:xfrm>
+            <a:off x="0" y="4133165"/>
+            <a:ext cx="2221694" cy="646331"/>
+          </a:xfrm>
+          <a:prstGeom prst="rect">
+            <a:avLst/>
+          </a:prstGeom>
+          <a:noFill/>
+        </p:spPr>
+        <p:txBody>
+          <a:bodyPr wrap="none" rtlCol="0">
+            <a:spAutoFit/>
+          </a:bodyPr>
+          <a:lstStyle/>
+          <a:p>
+            <a:r>
+              <a:rPr lang="en-US" dirty="0" err="1"/>
+              <a:t>Wifi</a:t>
+            </a:r>
+            <a:r>
+              <a:rPr lang="en-US" dirty="0"/>
+              <a:t> SSID: “We Work”</a:t>
+            </a:r>
+            <a:br>
+              <a:rPr lang="en-US" dirty="0"/>
+            </a:br>
+            <a:r>
+              <a:rPr lang="en-US" dirty="0"/>
+              <a:t>pass: P@ssw0rd</a:t>
+            </a:r>
           </a:p>
         </p:txBody>
       </p:sp>
@@ -3208,46 +3254,136 @@
           <a:chExt cx="0" cy="0"/>
         </a:xfrm>
       </p:grpSpPr>
-      <p:pic>
-        <p:nvPicPr>
-          <p:cNvPr id="6" name="Picture 5" descr="64225164.jpg"/>
-          <p:cNvPicPr>
-            <a:picLocks noChangeAspect="1"/>
-          </p:cNvPicPr>
-          <p:nvPr/>
-        </p:nvPicPr>
-        <p:blipFill>
-          <a:blip r:embed="rId2">
-            <a:extLst>
-              <a:ext uri="{28A0092B-C50C-407E-A947-70E740481C1C}">
-                <a14:useLocalDpi xmlns:a14="http://schemas.microsoft.com/office/drawing/2010/main" val="0"/>
-              </a:ext>
-            </a:extLst>
-          </a:blip>
-          <a:stretch>
-            <a:fillRect/>
-          </a:stretch>
-        </p:blipFill>
-        <p:spPr>
-          <a:xfrm>
-            <a:off x="1950720" y="985520"/>
-            <a:ext cx="5080000" cy="5080000"/>
-          </a:xfrm>
-          <a:prstGeom prst="rect">
-            <a:avLst/>
-          </a:prstGeom>
-        </p:spPr>
-      </p:pic>
+      <p:sp>
+        <p:nvSpPr>
+          <p:cNvPr id="2" name="Title 1"/>
+          <p:cNvSpPr>
+            <a:spLocks noGrp="1"/>
+          </p:cNvSpPr>
+          <p:nvPr>
+            <p:ph type="title"/>
+          </p:nvPr>
+        </p:nvSpPr>
+        <p:spPr/>
+        <p:txBody>
+          <a:bodyPr/>
+          <a:lstStyle/>
+          <a:p>
+            <a:r>
+              <a:rPr lang="en-US" dirty="0" err="1" smtClean="0"/>
+              <a:t>Git</a:t>
+            </a:r>
+            <a:r>
+              <a:rPr lang="en-US" dirty="0" smtClean="0"/>
+              <a:t> </a:t>
+            </a:r>
+            <a:r>
+              <a:rPr lang="en-US" dirty="0" err="1" smtClean="0"/>
+              <a:t>init</a:t>
+            </a:r>
+            <a:endParaRPr lang="en-US" dirty="0"/>
+          </a:p>
+        </p:txBody>
+      </p:sp>
+      <p:sp>
+        <p:nvSpPr>
+          <p:cNvPr id="3" name="Content Placeholder 2"/>
+          <p:cNvSpPr>
+            <a:spLocks noGrp="1"/>
+          </p:cNvSpPr>
+          <p:nvPr>
+            <p:ph idx="1"/>
+          </p:nvPr>
+        </p:nvSpPr>
+        <p:spPr/>
+        <p:txBody>
+          <a:bodyPr/>
+          <a:lstStyle/>
+          <a:p>
+            <a:pPr marL="0" indent="0">
+              <a:buNone/>
+            </a:pPr>
+            <a:r>
+              <a:rPr lang="en-US" dirty="0" smtClean="0"/>
+              <a:t>This one is pretty straight forward, </a:t>
+            </a:r>
+            <a:r>
+              <a:rPr lang="en-US" dirty="0" err="1" smtClean="0"/>
+              <a:t>Git</a:t>
+            </a:r>
+            <a:r>
+              <a:rPr lang="en-US" dirty="0" smtClean="0"/>
+              <a:t> </a:t>
+            </a:r>
+            <a:r>
+              <a:rPr lang="en-US" dirty="0" err="1" smtClean="0"/>
+              <a:t>init</a:t>
+            </a:r>
+            <a:r>
+              <a:rPr lang="en-US" dirty="0" smtClean="0"/>
+              <a:t> = </a:t>
+            </a:r>
+            <a:r>
+              <a:rPr lang="en-US" dirty="0" err="1" smtClean="0"/>
+              <a:t>git</a:t>
+            </a:r>
+            <a:r>
+              <a:rPr lang="en-US" dirty="0" smtClean="0"/>
+              <a:t> initialize.</a:t>
+            </a:r>
+          </a:p>
+          <a:p>
+            <a:pPr marL="0" indent="0">
+              <a:buNone/>
+            </a:pPr>
+            <a:endParaRPr lang="en-US" b="1" dirty="0"/>
+          </a:p>
+          <a:p>
+            <a:pPr marL="0" indent="0">
+              <a:buNone/>
+            </a:pPr>
+            <a:r>
+              <a:rPr lang="en-US" b="1" dirty="0" smtClean="0"/>
+              <a:t> This tells </a:t>
+            </a:r>
+            <a:r>
+              <a:rPr lang="en-US" b="1" dirty="0" err="1" smtClean="0"/>
+              <a:t>git</a:t>
+            </a:r>
+            <a:r>
+              <a:rPr lang="en-US" b="1" dirty="0" smtClean="0"/>
+              <a:t> “hey, pay attention to what I’m doing in this folder”.</a:t>
+            </a:r>
+            <a:r>
+              <a:rPr lang="en-US" dirty="0" smtClean="0"/>
+              <a:t> </a:t>
+            </a:r>
+          </a:p>
+          <a:p>
+            <a:pPr marL="0" indent="0">
+              <a:buNone/>
+            </a:pPr>
+            <a:endParaRPr lang="en-US" dirty="0"/>
+          </a:p>
+        </p:txBody>
+      </p:sp>
     </p:spTree>
     <p:extLst>
       <p:ext uri="{BB962C8B-B14F-4D97-AF65-F5344CB8AC3E}">
-        <p14:creationId xmlns:p14="http://schemas.microsoft.com/office/powerpoint/2010/main" val="126048996"/>
+        <p14:creationId xmlns:p14="http://schemas.microsoft.com/office/powerpoint/2010/main" val="2795063024"/>
       </p:ext>
     </p:extLst>
   </p:cSld>
   <p:clrMapOvr>
     <a:masterClrMapping/>
   </p:clrMapOvr>
+  <p:timing>
+    <p:tnLst>
+      <p:par>
+        <p:cTn xmlns:p14="http://schemas.microsoft.com/office/powerpoint/2010/main" id="1" dur="indefinite" restart="never" nodeType="tmRoot"/>
+      </p:par>
+    </p:tnLst>
+  </p:timing>
 </p:sld>
 </file>
 
@@ -3289,11 +3425,7 @@
             </a:r>
             <a:r>
               <a:rPr lang="en-US" dirty="0" smtClean="0"/>
-              <a:t> </a:t>
-            </a:r>
-            <a:r>
-              <a:rPr lang="en-US" dirty="0" err="1" smtClean="0"/>
-              <a:t>init</a:t>
+              <a:t> add</a:t>
             </a:r>
             <a:endParaRPr lang="en-US" dirty="0"/>
           </a:p>
@@ -3311,7 +3443,9 @@
         </p:nvSpPr>
         <p:spPr/>
         <p:txBody>
-          <a:bodyPr/>
+          <a:bodyPr>
+            <a:normAutofit fontScale="92500" lnSpcReduction="10000"/>
+          </a:bodyPr>
           <a:lstStyle/>
           <a:p>
             <a:pPr marL="0" indent="0">
@@ -3319,23 +3453,7 @@
             </a:pPr>
             <a:r>
               <a:rPr lang="en-US" dirty="0" smtClean="0"/>
-              <a:t>This one is pretty straight forward, </a:t>
-            </a:r>
-            <a:r>
-              <a:rPr lang="en-US" dirty="0" err="1" smtClean="0"/>
-              <a:t>Git</a:t>
-            </a:r>
-            <a:r>
-              <a:rPr lang="en-US" dirty="0" smtClean="0"/>
-              <a:t> </a:t>
-            </a:r>
-            <a:r>
-              <a:rPr lang="en-US" dirty="0" err="1" smtClean="0"/>
-              <a:t>init</a:t>
-            </a:r>
-            <a:r>
-              <a:rPr lang="en-US" dirty="0" smtClean="0"/>
-              <a:t> = </a:t>
+              <a:t>This tells </a:t>
             </a:r>
             <a:r>
               <a:rPr lang="en-US" dirty="0" err="1" smtClean="0"/>
@@ -3343,40 +3461,97 @@
             </a:r>
             <a:r>
               <a:rPr lang="en-US" dirty="0" smtClean="0"/>
-              <a:t> initialize.</a:t>
+              <a:t> to add all the changes you just made </a:t>
             </a:r>
           </a:p>
           <a:p>
             <a:pPr marL="0" indent="0">
               <a:buNone/>
             </a:pPr>
-            <a:endParaRPr lang="en-US" b="1" dirty="0"/>
+            <a:endParaRPr lang="en-US" i="1" dirty="0"/>
           </a:p>
           <a:p>
             <a:pPr marL="0" indent="0">
               <a:buNone/>
             </a:pPr>
             <a:r>
+              <a:rPr lang="en-US" i="1" dirty="0" smtClean="0"/>
+              <a:t>Command line:</a:t>
+            </a:r>
+          </a:p>
+          <a:p>
+            <a:pPr marL="0" indent="0">
+              <a:buNone/>
+            </a:pPr>
+            <a:r>
+              <a:rPr lang="en-US" b="1" dirty="0" err="1" smtClean="0"/>
+              <a:t>Git</a:t>
+            </a:r>
+            <a:r>
               <a:rPr lang="en-US" b="1" dirty="0" smtClean="0"/>
-              <a:t> This tells </a:t>
-            </a:r>
+              <a:t> add</a:t>
+            </a:r>
+            <a:r>
+              <a:rPr lang="en-US" dirty="0" smtClean="0"/>
+              <a:t>  [file name I changed]</a:t>
+            </a:r>
+          </a:p>
+          <a:p>
+            <a:pPr marL="0" indent="0">
+              <a:buNone/>
+            </a:pPr>
+            <a:endParaRPr lang="en-US" dirty="0" smtClean="0"/>
+          </a:p>
+          <a:p>
+            <a:pPr marL="0" indent="0">
+              <a:buNone/>
+            </a:pPr>
+            <a:r>
+              <a:rPr lang="en-US" dirty="0" smtClean="0"/>
+              <a:t>Other options:</a:t>
+            </a:r>
+          </a:p>
+          <a:p>
+            <a:pPr marL="0" indent="0">
+              <a:buNone/>
+            </a:pPr>
             <a:r>
               <a:rPr lang="en-US" b="1" dirty="0" err="1" smtClean="0"/>
+              <a:t>Git</a:t>
+            </a:r>
+            <a:r>
+              <a:rPr lang="en-US" b="1" dirty="0" smtClean="0"/>
+              <a:t> add .</a:t>
+            </a:r>
+            <a:r>
+              <a:rPr lang="en-US" dirty="0" smtClean="0"/>
+              <a:t> </a:t>
+            </a:r>
+          </a:p>
+          <a:p>
+            <a:pPr marL="0" indent="0">
+              <a:buNone/>
+            </a:pPr>
+            <a:r>
+              <a:rPr lang="en-US" dirty="0" smtClean="0"/>
+              <a:t>(notice the dot). This tells </a:t>
+            </a:r>
+            <a:r>
+              <a:rPr lang="en-US" dirty="0" err="1" smtClean="0"/>
               <a:t>git</a:t>
             </a:r>
             <a:r>
-              <a:rPr lang="en-US" b="1" dirty="0" smtClean="0"/>
-              <a:t> “hey, pay attention to what I’m doing in this folder”.</a:t>
-            </a:r>
-            <a:r>
-              <a:rPr lang="en-US" dirty="0" smtClean="0"/>
-              <a:t> </a:t>
-            </a:r>
-          </a:p>
-          <a:p>
-            <a:pPr marL="0" indent="0">
-              <a:buNone/>
-            </a:pPr>
+              <a:rPr lang="en-US" dirty="0" smtClean="0"/>
+              <a:t> “</a:t>
+            </a:r>
+            <a:r>
+              <a:rPr lang="en-US" dirty="0" err="1" smtClean="0"/>
+              <a:t>Yo</a:t>
+            </a:r>
+            <a:r>
+              <a:rPr lang="en-US" dirty="0" smtClean="0"/>
+              <a:t>, I changed a lot of files, add them all” </a:t>
+            </a:r>
             <a:endParaRPr lang="en-US" dirty="0"/>
           </a:p>
         </p:txBody>
@@ -3384,7 +3559,7 @@
     </p:spTree>
     <p:extLst>
       <p:ext uri="{BB962C8B-B14F-4D97-AF65-F5344CB8AC3E}">
-        <p14:creationId xmlns:p14="http://schemas.microsoft.com/office/powerpoint/2010/main" val="2795063024"/>
+        <p14:creationId xmlns:p14="http://schemas.microsoft.com/office/powerpoint/2010/main" val="3870486487"/>
       </p:ext>
     </p:extLst>
   </p:cSld>
@@ -3439,7 +3614,7 @@
             </a:r>
             <a:r>
               <a:rPr lang="en-US" dirty="0" smtClean="0"/>
-              <a:t> add</a:t>
+              <a:t> commit</a:t>
             </a:r>
             <a:endParaRPr lang="en-US" dirty="0"/>
           </a:p>
@@ -3457,17 +3632,12 @@
         </p:nvSpPr>
         <p:spPr/>
         <p:txBody>
-          <a:bodyPr>
-            <a:normAutofit fontScale="92500" lnSpcReduction="10000"/>
-          </a:bodyPr>
-          <a:lstStyle/>
-          <a:p>
-            <a:pPr marL="0" indent="0">
-              <a:buNone/>
-            </a:pPr>
-            <a:r>
-              <a:rPr lang="en-US" dirty="0" smtClean="0"/>
-              <a:t>This tells </a:t>
+          <a:bodyPr/>
+          <a:lstStyle/>
+          <a:p>
+            <a:r>
+              <a:rPr lang="en-US" dirty="0" smtClean="0"/>
+              <a:t>A commit is like a “save” point. It’s a point in time that </a:t>
             </a:r>
             <a:r>
               <a:rPr lang="en-US" dirty="0" err="1" smtClean="0"/>
@@ -3475,40 +3645,18 @@
             </a:r>
             <a:r>
               <a:rPr lang="en-US" dirty="0" smtClean="0"/>
-              <a:t> to add all the changes you just made </a:t>
-            </a:r>
-          </a:p>
-          <a:p>
-            <a:pPr marL="0" indent="0">
-              <a:buNone/>
-            </a:pPr>
-            <a:endParaRPr lang="en-US" i="1" dirty="0"/>
-          </a:p>
-          <a:p>
-            <a:pPr marL="0" indent="0">
-              <a:buNone/>
-            </a:pPr>
-            <a:r>
-              <a:rPr lang="en-US" i="1" dirty="0" smtClean="0"/>
-              <a:t>Command line:</a:t>
-            </a:r>
-          </a:p>
-          <a:p>
-            <a:pPr marL="0" indent="0">
-              <a:buNone/>
-            </a:pPr>
-            <a:r>
-              <a:rPr lang="en-US" b="1" dirty="0" err="1" smtClean="0"/>
-              <a:t>Git</a:t>
-            </a:r>
-            <a:r>
-              <a:rPr lang="en-US" b="1" dirty="0" smtClean="0"/>
-              <a:t> add</a:t>
-            </a:r>
-            <a:r>
-              <a:rPr lang="en-US" dirty="0" smtClean="0"/>
-              <a:t>  [file name I changed]</a:t>
-            </a:r>
+              <a:t> knows stuff changed. </a:t>
+            </a:r>
+          </a:p>
+          <a:p>
+            <a:endParaRPr lang="en-US" dirty="0" smtClean="0"/>
+          </a:p>
+          <a:p>
+            <a:r>
+              <a:rPr lang="en-US" dirty="0" smtClean="0"/>
+              <a:t>Good metric of productivity, lots of commits means lots of code that was added (or subtracted)</a:t>
+            </a:r>
+            <a:endParaRPr lang="en-US" dirty="0"/>
           </a:p>
           <a:p>
             <a:pPr marL="0" indent="0">
@@ -3520,60 +3668,14 @@
             <a:pPr marL="0" indent="0">
               <a:buNone/>
             </a:pPr>
-            <a:r>
-              <a:rPr lang="en-US" dirty="0" smtClean="0"/>
-              <a:t>Other options:</a:t>
-            </a:r>
-          </a:p>
-          <a:p>
-            <a:pPr marL="0" indent="0">
-              <a:buNone/>
-            </a:pPr>
-            <a:r>
-              <a:rPr lang="en-US" b="1" dirty="0" err="1" smtClean="0"/>
-              <a:t>Git</a:t>
-            </a:r>
-            <a:r>
-              <a:rPr lang="en-US" b="1" dirty="0" smtClean="0"/>
-              <a:t> add .</a:t>
-            </a:r>
-            <a:r>
-              <a:rPr lang="en-US" dirty="0" smtClean="0"/>
-              <a:t> </a:t>
-            </a:r>
-          </a:p>
-          <a:p>
-            <a:pPr marL="0" indent="0">
-              <a:buNone/>
-            </a:pPr>
-            <a:r>
-              <a:rPr lang="en-US" dirty="0" smtClean="0"/>
-              <a:t>(notice the dot). This tells </a:t>
-            </a:r>
-            <a:r>
-              <a:rPr lang="en-US" dirty="0" err="1" smtClean="0"/>
-              <a:t>git</a:t>
-            </a:r>
-            <a:r>
-              <a:rPr lang="en-US" dirty="0" smtClean="0"/>
-              <a:t> “</a:t>
-            </a:r>
-            <a:r>
-              <a:rPr lang="en-US" dirty="0" err="1" smtClean="0"/>
-              <a:t>Yo</a:t>
-            </a:r>
-            <a:r>
-              <a:rPr lang="en-US" dirty="0" smtClean="0"/>
-              <a:t>, I changed a lot of files, add them all” </a:t>
-            </a:r>
-            <a:endParaRPr lang="en-US" dirty="0"/>
+            <a:endParaRPr lang="en-US" dirty="0" smtClean="0"/>
           </a:p>
         </p:txBody>
       </p:sp>
     </p:spTree>
     <p:extLst>
       <p:ext uri="{BB962C8B-B14F-4D97-AF65-F5344CB8AC3E}">
-        <p14:creationId xmlns:p14="http://schemas.microsoft.com/office/powerpoint/2010/main" val="3870486487"/>
+        <p14:creationId xmlns:p14="http://schemas.microsoft.com/office/powerpoint/2010/main" val="4084723148"/>
       </p:ext>
     </p:extLst>
   </p:cSld>
@@ -3623,73 +3725,76 @@
           <a:lstStyle/>
           <a:p>
             <a:r>
+              <a:rPr lang="en-US" dirty="0" smtClean="0"/>
+              <a:t>Commit continued </a:t>
+            </a:r>
+            <a:endParaRPr lang="en-US" dirty="0"/>
+          </a:p>
+        </p:txBody>
+      </p:sp>
+      <p:sp>
+        <p:nvSpPr>
+          <p:cNvPr id="3" name="Content Placeholder 2"/>
+          <p:cNvSpPr>
+            <a:spLocks noGrp="1"/>
+          </p:cNvSpPr>
+          <p:nvPr>
+            <p:ph idx="1"/>
+          </p:nvPr>
+        </p:nvSpPr>
+        <p:spPr/>
+        <p:txBody>
+          <a:bodyPr/>
+          <a:lstStyle/>
+          <a:p>
+            <a:r>
+              <a:rPr lang="en-US" dirty="0" smtClean="0"/>
+              <a:t>Example on live repo</a:t>
+            </a:r>
+          </a:p>
+          <a:p>
+            <a:pPr lvl="1"/>
+            <a:r>
+              <a:rPr lang="en-US" dirty="0" smtClean="0"/>
+              <a:t>Productivity</a:t>
+            </a:r>
+          </a:p>
+          <a:p>
+            <a:pPr lvl="1"/>
+            <a:r>
+              <a:rPr lang="en-US" dirty="0" smtClean="0"/>
+              <a:t>Watching </a:t>
+            </a:r>
+            <a:r>
               <a:rPr lang="en-US" dirty="0" err="1" smtClean="0"/>
-              <a:t>Git</a:t>
-            </a:r>
-            <a:r>
-              <a:rPr lang="en-US" dirty="0" smtClean="0"/>
-              <a:t> commit</a:t>
-            </a:r>
+              <a:t>devs</a:t>
+            </a:r>
+            <a:endParaRPr lang="en-US" dirty="0" smtClean="0"/>
+          </a:p>
+          <a:p>
+            <a:pPr lvl="1"/>
+            <a:r>
+              <a:rPr lang="en-US" dirty="0" smtClean="0"/>
+              <a:t>Blame</a:t>
+            </a:r>
+          </a:p>
+          <a:p>
+            <a:pPr lvl="1"/>
+            <a:endParaRPr lang="en-US" dirty="0" smtClean="0"/>
+          </a:p>
+          <a:p>
+            <a:pPr lvl="1"/>
+            <a:endParaRPr lang="en-US" dirty="0" smtClean="0"/>
+          </a:p>
+          <a:p>
             <a:endParaRPr lang="en-US" dirty="0"/>
-          </a:p>
-        </p:txBody>
-      </p:sp>
-      <p:sp>
-        <p:nvSpPr>
-          <p:cNvPr id="3" name="Content Placeholder 2"/>
-          <p:cNvSpPr>
-            <a:spLocks noGrp="1"/>
-          </p:cNvSpPr>
-          <p:nvPr>
-            <p:ph idx="1"/>
-          </p:nvPr>
-        </p:nvSpPr>
-        <p:spPr/>
-        <p:txBody>
-          <a:bodyPr/>
-          <a:lstStyle/>
-          <a:p>
-            <a:r>
-              <a:rPr lang="en-US" dirty="0" smtClean="0"/>
-              <a:t>A commit is like a “save” point. It’s a point in time that </a:t>
-            </a:r>
-            <a:r>
-              <a:rPr lang="en-US" dirty="0" err="1" smtClean="0"/>
-              <a:t>git</a:t>
-            </a:r>
-            <a:r>
-              <a:rPr lang="en-US" dirty="0" smtClean="0"/>
-              <a:t> knows stuff changed. </a:t>
-            </a:r>
-          </a:p>
-          <a:p>
-            <a:endParaRPr lang="en-US" dirty="0" smtClean="0"/>
-          </a:p>
-          <a:p>
-            <a:r>
-              <a:rPr lang="en-US" dirty="0" smtClean="0"/>
-              <a:t>Good metric of productivity, lots of commits means lots of code that was added (or subtracted)</a:t>
-            </a:r>
-            <a:endParaRPr lang="en-US" dirty="0"/>
-          </a:p>
-          <a:p>
-            <a:pPr marL="0" indent="0">
-              <a:buNone/>
-            </a:pPr>
-            <a:endParaRPr lang="en-US" dirty="0" smtClean="0"/>
-          </a:p>
-          <a:p>
-            <a:pPr marL="0" indent="0">
-              <a:buNone/>
-            </a:pPr>
-            <a:endParaRPr lang="en-US" dirty="0" smtClean="0"/>
           </a:p>
         </p:txBody>
       </p:sp>
     </p:spTree>
     <p:extLst>
       <p:ext uri="{BB962C8B-B14F-4D97-AF65-F5344CB8AC3E}">
-        <p14:creationId xmlns:p14="http://schemas.microsoft.com/office/powerpoint/2010/main" val="4084723148"/>
+        <p14:creationId xmlns:p14="http://schemas.microsoft.com/office/powerpoint/2010/main" val="4108570809"/>
       </p:ext>
     </p:extLst>
   </p:cSld>
@@ -3739,91 +3844,6 @@
           <a:lstStyle/>
           <a:p>
             <a:r>
-              <a:rPr lang="en-US" dirty="0" smtClean="0"/>
-              <a:t>Commit continued </a:t>
-            </a:r>
-            <a:endParaRPr lang="en-US" dirty="0"/>
-          </a:p>
-        </p:txBody>
-      </p:sp>
-      <p:sp>
-        <p:nvSpPr>
-          <p:cNvPr id="3" name="Content Placeholder 2"/>
-          <p:cNvSpPr>
-            <a:spLocks noGrp="1"/>
-          </p:cNvSpPr>
-          <p:nvPr>
-            <p:ph idx="1"/>
-          </p:nvPr>
-        </p:nvSpPr>
-        <p:spPr/>
-        <p:txBody>
-          <a:bodyPr/>
-          <a:lstStyle/>
-          <a:p>
-            <a:r>
-              <a:rPr lang="en-US" dirty="0" smtClean="0"/>
-              <a:t>Example on live repo</a:t>
-            </a:r>
-          </a:p>
-          <a:p>
-            <a:endParaRPr lang="en-US" dirty="0"/>
-          </a:p>
-        </p:txBody>
-      </p:sp>
-    </p:spTree>
-    <p:extLst>
-      <p:ext uri="{BB962C8B-B14F-4D97-AF65-F5344CB8AC3E}">
-        <p14:creationId xmlns:p14="http://schemas.microsoft.com/office/powerpoint/2010/main" val="4108570809"/>
-      </p:ext>
-    </p:extLst>
-  </p:cSld>
-  <p:clrMapOvr>
-    <a:masterClrMapping/>
-  </p:clrMapOvr>
-  <p:timing>
-    <p:tnLst>
-      <p:par>
-        <p:cTn xmlns:p14="http://schemas.microsoft.com/office/powerpoint/2010/main" id="1" dur="indefinite" restart="never" nodeType="tmRoot"/>
-      </p:par>
-    </p:tnLst>
-  </p:timing>
-</p:sld>
-</file>
-
-<file path=ppt/slides/slide15.xml><?xml version="1.0" encoding="utf-8"?>
-<p:sld xmlns:a="http://schemas.openxmlformats.org/drawingml/2006/main" xmlns:r="http://schemas.openxmlformats.org/officeDocument/2006/relationships" xmlns:p="http://schemas.openxmlformats.org/presentationml/2006/main">
-  <p:cSld>
-    <p:spTree>
-      <p:nvGrpSpPr>
-        <p:cNvPr id="1" name=""/>
-        <p:cNvGrpSpPr/>
-        <p:nvPr/>
-      </p:nvGrpSpPr>
-      <p:grpSpPr>
-        <a:xfrm>
-          <a:off x="0" y="0"/>
-          <a:ext cx="0" cy="0"/>
-          <a:chOff x="0" y="0"/>
-          <a:chExt cx="0" cy="0"/>
-        </a:xfrm>
-      </p:grpSpPr>
-      <p:sp>
-        <p:nvSpPr>
-          <p:cNvPr id="2" name="Title 1"/>
-          <p:cNvSpPr>
-            <a:spLocks noGrp="1"/>
-          </p:cNvSpPr>
-          <p:nvPr>
-            <p:ph type="title"/>
-          </p:nvPr>
-        </p:nvSpPr>
-        <p:spPr/>
-        <p:txBody>
-          <a:bodyPr/>
-          <a:lstStyle/>
-          <a:p>
-            <a:r>
               <a:rPr lang="en-US" dirty="0" err="1" smtClean="0"/>
               <a:t>Git</a:t>
             </a:r>
@@ -3848,7 +3868,7 @@
         <p:spPr/>
         <p:txBody>
           <a:bodyPr>
-            <a:normAutofit fontScale="92500" lnSpcReduction="20000"/>
+            <a:normAutofit fontScale="85000" lnSpcReduction="10000"/>
           </a:bodyPr>
           <a:lstStyle/>
           <a:p>
@@ -3870,6 +3890,9 @@
               <a:rPr lang="en-US" dirty="0" smtClean="0"/>
               <a:t>Why? So everyone else on your team can see what you did. Example:</a:t>
             </a:r>
+          </a:p>
+          <a:p>
+            <a:endParaRPr lang="en-US" dirty="0" smtClean="0"/>
           </a:p>
           <a:p>
             <a:pPr marL="0" indent="0">
@@ -3943,14 +3966,228 @@
   <p:timing>
     <p:tnLst>
       <p:par>
-        <p:cTn xmlns:p14="http://schemas.microsoft.com/office/powerpoint/2010/main" id="1" dur="indefinite" restart="never" nodeType="tmRoot"/>
+        <p:cTn xmlns:p14="http://schemas.microsoft.com/office/powerpoint/2010/main" id="1" dur="indefinite" restart="never" nodeType="tmRoot">
+          <p:childTnLst>
+            <p:seq concurrent="1" nextAc="seek">
+              <p:cTn id="2" dur="indefinite" nodeType="mainSeq">
+                <p:childTnLst>
+                  <p:par>
+                    <p:cTn id="3" fill="hold">
+                      <p:stCondLst>
+                        <p:cond delay="indefinite"/>
+                      </p:stCondLst>
+                      <p:childTnLst>
+                        <p:par>
+                          <p:cTn id="4" fill="hold">
+                            <p:stCondLst>
+                              <p:cond delay="0"/>
+                            </p:stCondLst>
+                            <p:childTnLst>
+                              <p:par>
+                                <p:cTn id="5" presetID="1" presetClass="entr" presetSubtype="0" fill="hold" nodeType="clickEffect">
+                                  <p:stCondLst>
+                                    <p:cond delay="0"/>
+                                  </p:stCondLst>
+                                  <p:childTnLst>
+                                    <p:set>
+                                      <p:cBhvr>
+                                        <p:cTn id="6" dur="1" fill="hold">
+                                          <p:stCondLst>
+                                            <p:cond delay="0"/>
+                                          </p:stCondLst>
+                                        </p:cTn>
+                                        <p:tgtEl>
+                                          <p:spTgt spid="3">
+                                            <p:txEl>
+                                              <p:pRg st="1" end="1"/>
+                                            </p:txEl>
+                                          </p:spTgt>
+                                        </p:tgtEl>
+                                        <p:attrNameLst>
+                                          <p:attrName>style.visibility</p:attrName>
+                                        </p:attrNameLst>
+                                      </p:cBhvr>
+                                      <p:to>
+                                        <p:strVal val="visible"/>
+                                      </p:to>
+                                    </p:set>
+                                  </p:childTnLst>
+                                </p:cTn>
+                              </p:par>
+                            </p:childTnLst>
+                          </p:cTn>
+                        </p:par>
+                      </p:childTnLst>
+                    </p:cTn>
+                  </p:par>
+                  <p:par>
+                    <p:cTn id="7" fill="hold">
+                      <p:stCondLst>
+                        <p:cond delay="indefinite"/>
+                      </p:stCondLst>
+                      <p:childTnLst>
+                        <p:par>
+                          <p:cTn id="8" fill="hold">
+                            <p:stCondLst>
+                              <p:cond delay="0"/>
+                            </p:stCondLst>
+                            <p:childTnLst>
+                              <p:par>
+                                <p:cTn id="9" presetID="1" presetClass="entr" presetSubtype="0" fill="hold" nodeType="clickEffect">
+                                  <p:stCondLst>
+                                    <p:cond delay="0"/>
+                                  </p:stCondLst>
+                                  <p:childTnLst>
+                                    <p:set>
+                                      <p:cBhvr>
+                                        <p:cTn id="10" dur="1" fill="hold">
+                                          <p:stCondLst>
+                                            <p:cond delay="0"/>
+                                          </p:stCondLst>
+                                        </p:cTn>
+                                        <p:tgtEl>
+                                          <p:spTgt spid="3">
+                                            <p:txEl>
+                                              <p:pRg st="3" end="3"/>
+                                            </p:txEl>
+                                          </p:spTgt>
+                                        </p:tgtEl>
+                                        <p:attrNameLst>
+                                          <p:attrName>style.visibility</p:attrName>
+                                        </p:attrNameLst>
+                                      </p:cBhvr>
+                                      <p:to>
+                                        <p:strVal val="visible"/>
+                                      </p:to>
+                                    </p:set>
+                                  </p:childTnLst>
+                                </p:cTn>
+                              </p:par>
+                              <p:par>
+                                <p:cTn id="11" presetID="1" presetClass="entr" presetSubtype="0" fill="hold" nodeType="withEffect">
+                                  <p:stCondLst>
+                                    <p:cond delay="0"/>
+                                  </p:stCondLst>
+                                  <p:childTnLst>
+                                    <p:set>
+                                      <p:cBhvr>
+                                        <p:cTn id="12" dur="1" fill="hold">
+                                          <p:stCondLst>
+                                            <p:cond delay="0"/>
+                                          </p:stCondLst>
+                                        </p:cTn>
+                                        <p:tgtEl>
+                                          <p:spTgt spid="3">
+                                            <p:txEl>
+                                              <p:pRg st="4" end="4"/>
+                                            </p:txEl>
+                                          </p:spTgt>
+                                        </p:tgtEl>
+                                        <p:attrNameLst>
+                                          <p:attrName>style.visibility</p:attrName>
+                                        </p:attrNameLst>
+                                      </p:cBhvr>
+                                      <p:to>
+                                        <p:strVal val="visible"/>
+                                      </p:to>
+                                    </p:set>
+                                  </p:childTnLst>
+                                </p:cTn>
+                              </p:par>
+                              <p:par>
+                                <p:cTn id="13" presetID="1" presetClass="entr" presetSubtype="0" fill="hold" nodeType="withEffect">
+                                  <p:stCondLst>
+                                    <p:cond delay="0"/>
+                                  </p:stCondLst>
+                                  <p:childTnLst>
+                                    <p:set>
+                                      <p:cBhvr>
+                                        <p:cTn id="14" dur="1" fill="hold">
+                                          <p:stCondLst>
+                                            <p:cond delay="0"/>
+                                          </p:stCondLst>
+                                        </p:cTn>
+                                        <p:tgtEl>
+                                          <p:spTgt spid="3">
+                                            <p:txEl>
+                                              <p:pRg st="5" end="5"/>
+                                            </p:txEl>
+                                          </p:spTgt>
+                                        </p:tgtEl>
+                                        <p:attrNameLst>
+                                          <p:attrName>style.visibility</p:attrName>
+                                        </p:attrNameLst>
+                                      </p:cBhvr>
+                                      <p:to>
+                                        <p:strVal val="visible"/>
+                                      </p:to>
+                                    </p:set>
+                                  </p:childTnLst>
+                                </p:cTn>
+                              </p:par>
+                              <p:par>
+                                <p:cTn id="15" presetID="1" presetClass="entr" presetSubtype="0" fill="hold" nodeType="withEffect">
+                                  <p:stCondLst>
+                                    <p:cond delay="0"/>
+                                  </p:stCondLst>
+                                  <p:childTnLst>
+                                    <p:set>
+                                      <p:cBhvr>
+                                        <p:cTn id="16" dur="1" fill="hold">
+                                          <p:stCondLst>
+                                            <p:cond delay="0"/>
+                                          </p:stCondLst>
+                                        </p:cTn>
+                                        <p:tgtEl>
+                                          <p:spTgt spid="3">
+                                            <p:txEl>
+                                              <p:pRg st="6" end="6"/>
+                                            </p:txEl>
+                                          </p:spTgt>
+                                        </p:tgtEl>
+                                        <p:attrNameLst>
+                                          <p:attrName>style.visibility</p:attrName>
+                                        </p:attrNameLst>
+                                      </p:cBhvr>
+                                      <p:to>
+                                        <p:strVal val="visible"/>
+                                      </p:to>
+                                    </p:set>
+                                  </p:childTnLst>
+                                </p:cTn>
+                              </p:par>
+                            </p:childTnLst>
+                          </p:cTn>
+                        </p:par>
+                      </p:childTnLst>
+                    </p:cTn>
+                  </p:par>
+                </p:childTnLst>
+              </p:cTn>
+              <p:prevCondLst>
+                <p:cond evt="onPrev" delay="0">
+                  <p:tgtEl>
+                    <p:sldTgt/>
+                  </p:tgtEl>
+                </p:cond>
+              </p:prevCondLst>
+              <p:nextCondLst>
+                <p:cond evt="onNext" delay="0">
+                  <p:tgtEl>
+                    <p:sldTgt/>
+                  </p:tgtEl>
+                </p:cond>
+              </p:nextCondLst>
+            </p:seq>
+          </p:childTnLst>
+        </p:cTn>
       </p:par>
     </p:tnLst>
   </p:timing>
 </p:sld>
 </file>
 
-<file path=ppt/slides/slide16.xml><?xml version="1.0" encoding="utf-8"?>
+<file path=ppt/slides/slide15.xml><?xml version="1.0" encoding="utf-8"?>
 <p:sld xmlns:a="http://schemas.openxmlformats.org/drawingml/2006/main" xmlns:r="http://schemas.openxmlformats.org/officeDocument/2006/relationships" xmlns:p="http://schemas.openxmlformats.org/presentationml/2006/main">
   <p:cSld>
     <p:spTree>
@@ -4077,7 +4314,7 @@
 </p:sld>
 </file>
 
-<file path=ppt/slides/slide17.xml><?xml version="1.0" encoding="utf-8"?>
+<file path=ppt/slides/slide16.xml><?xml version="1.0" encoding="utf-8"?>
 <p:sld xmlns:a="http://schemas.openxmlformats.org/drawingml/2006/main" xmlns:r="http://schemas.openxmlformats.org/officeDocument/2006/relationships" xmlns:p="http://schemas.openxmlformats.org/presentationml/2006/main">
   <p:cSld>
     <p:spTree>
@@ -4352,6 +4589,181 @@
 </p:sld>
 </file>
 
+<file path=ppt/slides/slide17.xml><?xml version="1.0" encoding="utf-8"?>
+<p:sld xmlns:a="http://schemas.openxmlformats.org/drawingml/2006/main" xmlns:r="http://schemas.openxmlformats.org/officeDocument/2006/relationships" xmlns:p="http://schemas.openxmlformats.org/presentationml/2006/main">
+  <p:cSld>
+    <p:spTree>
+      <p:nvGrpSpPr>
+        <p:cNvPr id="1" name=""/>
+        <p:cNvGrpSpPr/>
+        <p:nvPr/>
+      </p:nvGrpSpPr>
+      <p:grpSpPr>
+        <a:xfrm>
+          <a:off x="0" y="0"/>
+          <a:ext cx="0" cy="0"/>
+          <a:chOff x="0" y="0"/>
+          <a:chExt cx="0" cy="0"/>
+        </a:xfrm>
+      </p:grpSpPr>
+      <p:sp>
+        <p:nvSpPr>
+          <p:cNvPr id="2" name="Title 1"/>
+          <p:cNvSpPr>
+            <a:spLocks noGrp="1"/>
+          </p:cNvSpPr>
+          <p:nvPr>
+            <p:ph type="title"/>
+          </p:nvPr>
+        </p:nvSpPr>
+        <p:spPr/>
+        <p:txBody>
+          <a:bodyPr/>
+          <a:lstStyle/>
+          <a:p>
+            <a:r>
+              <a:rPr lang="en-US" dirty="0" smtClean="0"/>
+              <a:t>So much m0ar! </a:t>
+            </a:r>
+            <a:endParaRPr lang="en-US" dirty="0"/>
+          </a:p>
+        </p:txBody>
+      </p:sp>
+      <p:sp>
+        <p:nvSpPr>
+          <p:cNvPr id="3" name="Content Placeholder 2"/>
+          <p:cNvSpPr>
+            <a:spLocks noGrp="1"/>
+          </p:cNvSpPr>
+          <p:nvPr>
+            <p:ph idx="1"/>
+          </p:nvPr>
+        </p:nvSpPr>
+        <p:spPr>
+          <a:xfrm>
+            <a:off x="457200" y="1600200"/>
+            <a:ext cx="8229600" cy="4505959"/>
+          </a:xfrm>
+        </p:spPr>
+        <p:txBody>
+          <a:bodyPr>
+            <a:normAutofit/>
+          </a:bodyPr>
+          <a:lstStyle/>
+          <a:p>
+            <a:r>
+              <a:rPr lang="en-US" dirty="0" smtClean="0"/>
+              <a:t>This is 1% of what </a:t>
+            </a:r>
+            <a:r>
+              <a:rPr lang="en-US" dirty="0" err="1" smtClean="0"/>
+              <a:t>git</a:t>
+            </a:r>
+            <a:r>
+              <a:rPr lang="en-US" dirty="0" smtClean="0"/>
+              <a:t> (and </a:t>
+            </a:r>
+            <a:r>
+              <a:rPr lang="en-US" dirty="0" err="1" smtClean="0"/>
+              <a:t>github</a:t>
+            </a:r>
+            <a:r>
+              <a:rPr lang="en-US" dirty="0" smtClean="0"/>
+              <a:t>) is capable of.</a:t>
+            </a:r>
+          </a:p>
+          <a:p>
+            <a:r>
+              <a:rPr lang="en-US" dirty="0" smtClean="0"/>
+              <a:t>Other uses? Take someone else’s code!</a:t>
+            </a:r>
+          </a:p>
+          <a:p>
+            <a:pPr lvl="1"/>
+            <a:r>
+              <a:rPr lang="en-US" dirty="0" smtClean="0">
+                <a:hlinkClick r:id="rId2"/>
+              </a:rPr>
+              <a:t>https://github.com/Netflix</a:t>
+            </a:r>
+            <a:endParaRPr lang="en-US" dirty="0" smtClean="0"/>
+          </a:p>
+          <a:p>
+            <a:pPr lvl="1"/>
+            <a:r>
+              <a:rPr lang="en-US" dirty="0" smtClean="0">
+                <a:hlinkClick r:id="rId3"/>
+              </a:rPr>
+              <a:t>https://github.com/twitter</a:t>
+            </a:r>
+            <a:endParaRPr lang="en-US" dirty="0" smtClean="0"/>
+          </a:p>
+          <a:p>
+            <a:r>
+              <a:rPr lang="en-US" dirty="0" smtClean="0"/>
+              <a:t>Make webpages directly from </a:t>
+            </a:r>
+            <a:r>
+              <a:rPr lang="en-US" dirty="0" err="1" smtClean="0"/>
+              <a:t>github</a:t>
+            </a:r>
+            <a:r>
+              <a:rPr lang="en-US" dirty="0"/>
+              <a:t> </a:t>
+            </a:r>
+            <a:r>
+              <a:rPr lang="en-US" dirty="0" smtClean="0"/>
+              <a:t>(Charlie wrote up a blog about it </a:t>
+            </a:r>
+            <a:r>
+              <a:rPr lang="en-US" dirty="0" err="1" smtClean="0"/>
+              <a:t>CharlesDouglasOsborn.com</a:t>
+            </a:r>
+            <a:r>
+              <a:rPr lang="en-US" smtClean="0"/>
+              <a:t>)</a:t>
+            </a:r>
+          </a:p>
+          <a:p>
+            <a:endParaRPr lang="en-US" dirty="0" smtClean="0"/>
+          </a:p>
+          <a:p>
+            <a:endParaRPr lang="en-US" dirty="0" smtClean="0"/>
+          </a:p>
+          <a:p>
+            <a:endParaRPr lang="en-US" dirty="0" smtClean="0"/>
+          </a:p>
+          <a:p>
+            <a:pPr lvl="1"/>
+            <a:endParaRPr lang="en-US" dirty="0" smtClean="0"/>
+          </a:p>
+          <a:p>
+            <a:pPr lvl="1"/>
+            <a:endParaRPr lang="en-US" dirty="0"/>
+          </a:p>
+          <a:p>
+            <a:pPr lvl="1"/>
+            <a:endParaRPr lang="en-US" dirty="0" smtClean="0"/>
+          </a:p>
+          <a:p>
+            <a:pPr lvl="1"/>
+            <a:endParaRPr lang="en-US" dirty="0" smtClean="0"/>
+          </a:p>
+        </p:txBody>
+      </p:sp>
+    </p:spTree>
+    <p:extLst>
+      <p:ext uri="{BB962C8B-B14F-4D97-AF65-F5344CB8AC3E}">
+        <p14:creationId xmlns:p14="http://schemas.microsoft.com/office/powerpoint/2010/main" val="1595898251"/>
+      </p:ext>
+    </p:extLst>
+  </p:cSld>
+  <p:clrMapOvr>
+    <a:masterClrMapping/>
+  </p:clrMapOvr>
+</p:sld>
+</file>
+
 <file path=ppt/slides/slide18.xml><?xml version="1.0" encoding="utf-8"?>
 <p:sld xmlns:a="http://schemas.openxmlformats.org/drawingml/2006/main" xmlns:r="http://schemas.openxmlformats.org/officeDocument/2006/relationships" xmlns:p="http://schemas.openxmlformats.org/presentationml/2006/main">
   <p:cSld>
@@ -4369,95 +4781,200 @@
           <a:chExt cx="0" cy="0"/>
         </a:xfrm>
       </p:grpSpPr>
-      <p:sp>
-        <p:nvSpPr>
-          <p:cNvPr id="2" name="Title 1"/>
-          <p:cNvSpPr>
-            <a:spLocks noGrp="1"/>
-          </p:cNvSpPr>
-          <p:nvPr>
-            <p:ph type="title"/>
-          </p:nvPr>
-        </p:nvSpPr>
-        <p:spPr/>
-        <p:txBody>
-          <a:bodyPr/>
-          <a:lstStyle/>
-          <a:p>
-            <a:r>
-              <a:rPr lang="en-US" dirty="0" smtClean="0"/>
-              <a:t>So much m0ar! </a:t>
-            </a:r>
-            <a:endParaRPr lang="en-US" dirty="0"/>
-          </a:p>
-        </p:txBody>
-      </p:sp>
-      <p:sp>
-        <p:nvSpPr>
-          <p:cNvPr id="3" name="Content Placeholder 2"/>
-          <p:cNvSpPr>
-            <a:spLocks noGrp="1"/>
-          </p:cNvSpPr>
-          <p:nvPr>
-            <p:ph idx="1"/>
-          </p:nvPr>
-        </p:nvSpPr>
-        <p:spPr/>
-        <p:txBody>
-          <a:bodyPr/>
-          <a:lstStyle/>
-          <a:p>
-            <a:r>
-              <a:rPr lang="en-US" dirty="0" smtClean="0"/>
-              <a:t>This is 1% of what </a:t>
-            </a:r>
-            <a:r>
-              <a:rPr lang="en-US" dirty="0" err="1" smtClean="0"/>
-              <a:t>git</a:t>
-            </a:r>
-            <a:r>
-              <a:rPr lang="en-US" dirty="0" smtClean="0"/>
-              <a:t> (and </a:t>
-            </a:r>
-            <a:r>
-              <a:rPr lang="en-US" dirty="0" err="1" smtClean="0"/>
-              <a:t>github</a:t>
-            </a:r>
-            <a:r>
-              <a:rPr lang="en-US" dirty="0" smtClean="0"/>
-              <a:t>) is capable of.</a:t>
-            </a:r>
-          </a:p>
-          <a:p>
-            <a:endParaRPr lang="en-US" dirty="0"/>
-          </a:p>
-          <a:p>
-            <a:r>
-              <a:rPr lang="en-US" dirty="0" smtClean="0"/>
-              <a:t>Want to know more? The </a:t>
-            </a:r>
-            <a:r>
-              <a:rPr lang="en-US" dirty="0" err="1" smtClean="0"/>
-              <a:t>github</a:t>
-            </a:r>
-            <a:r>
-              <a:rPr lang="en-US" dirty="0" smtClean="0"/>
-              <a:t> documentation is very easy to ready. Just copy/paste what they tell you to do and your good.</a:t>
-            </a:r>
-          </a:p>
-          <a:p>
-            <a:r>
-              <a:rPr lang="en-US" dirty="0" smtClean="0"/>
-              <a:t>Where is the beer?</a:t>
-            </a:r>
-            <a:endParaRPr lang="en-US" dirty="0"/>
-          </a:p>
-        </p:txBody>
-      </p:sp>
+      <p:pic>
+        <p:nvPicPr>
+          <p:cNvPr id="4" name="Picture 3"/>
+          <p:cNvPicPr>
+            <a:picLocks noChangeAspect="1"/>
+          </p:cNvPicPr>
+          <p:nvPr/>
+        </p:nvPicPr>
+        <p:blipFill>
+          <a:blip r:embed="rId2"/>
+          <a:stretch>
+            <a:fillRect/>
+          </a:stretch>
+        </p:blipFill>
+        <p:spPr>
+          <a:xfrm>
+            <a:off x="0" y="2006600"/>
+            <a:ext cx="9144000" cy="2834153"/>
+          </a:xfrm>
+          <a:prstGeom prst="rect">
+            <a:avLst/>
+          </a:prstGeom>
+        </p:spPr>
+      </p:pic>
     </p:spTree>
     <p:extLst>
       <p:ext uri="{BB962C8B-B14F-4D97-AF65-F5344CB8AC3E}">
-        <p14:creationId xmlns:p14="http://schemas.microsoft.com/office/powerpoint/2010/main" val="1595898251"/>
+        <p14:creationId xmlns:p14="http://schemas.microsoft.com/office/powerpoint/2010/main" val="2650431545"/>
+      </p:ext>
+    </p:extLst>
+  </p:cSld>
+  <p:clrMapOvr>
+    <a:masterClrMapping/>
+  </p:clrMapOvr>
+</p:sld>
+</file>
+
+<file path=ppt/slides/slide19.xml><?xml version="1.0" encoding="utf-8"?>
+<p:sld xmlns:a="http://schemas.openxmlformats.org/drawingml/2006/main" xmlns:r="http://schemas.openxmlformats.org/officeDocument/2006/relationships" xmlns:p="http://schemas.openxmlformats.org/presentationml/2006/main">
+  <p:cSld>
+    <p:spTree>
+      <p:nvGrpSpPr>
+        <p:cNvPr id="1" name=""/>
+        <p:cNvGrpSpPr/>
+        <p:nvPr/>
+      </p:nvGrpSpPr>
+      <p:grpSpPr>
+        <a:xfrm>
+          <a:off x="0" y="0"/>
+          <a:ext cx="0" cy="0"/>
+          <a:chOff x="0" y="0"/>
+          <a:chExt cx="0" cy="0"/>
+        </a:xfrm>
+      </p:grpSpPr>
+      <p:sp>
+        <p:nvSpPr>
+          <p:cNvPr id="2" name="Title 1"/>
+          <p:cNvSpPr>
+            <a:spLocks noGrp="1"/>
+          </p:cNvSpPr>
+          <p:nvPr>
+            <p:ph type="title"/>
+          </p:nvPr>
+        </p:nvSpPr>
+        <p:spPr/>
+        <p:txBody>
+          <a:bodyPr/>
+          <a:lstStyle/>
+          <a:p>
+            <a:r>
+              <a:rPr lang="en-US" dirty="0" smtClean="0"/>
+              <a:t>Hands on, lets jump in</a:t>
+            </a:r>
+            <a:endParaRPr lang="en-US" dirty="0"/>
+          </a:p>
+        </p:txBody>
+      </p:sp>
+      <p:sp>
+        <p:nvSpPr>
+          <p:cNvPr id="3" name="Content Placeholder 2"/>
+          <p:cNvSpPr>
+            <a:spLocks noGrp="1"/>
+          </p:cNvSpPr>
+          <p:nvPr>
+            <p:ph idx="1"/>
+          </p:nvPr>
+        </p:nvSpPr>
+        <p:spPr/>
+        <p:txBody>
+          <a:bodyPr>
+            <a:normAutofit lnSpcReduction="10000"/>
+          </a:bodyPr>
+          <a:lstStyle/>
+          <a:p>
+            <a:r>
+              <a:rPr lang="en-US" dirty="0" smtClean="0"/>
+              <a:t>Go to </a:t>
+            </a:r>
+            <a:r>
+              <a:rPr lang="en-US" dirty="0" smtClean="0">
+                <a:hlinkClick r:id="rId2"/>
+              </a:rPr>
+              <a:t>www.github.com</a:t>
+            </a:r>
+            <a:r>
+              <a:rPr lang="en-US" dirty="0" smtClean="0"/>
+              <a:t> </a:t>
+            </a:r>
+          </a:p>
+          <a:p>
+            <a:endParaRPr lang="en-US" dirty="0"/>
+          </a:p>
+          <a:p>
+            <a:r>
+              <a:rPr lang="en-US" dirty="0" smtClean="0"/>
+              <a:t>Not using the command line?</a:t>
+            </a:r>
+          </a:p>
+          <a:p>
+            <a:pPr marL="0" indent="0">
+              <a:buNone/>
+            </a:pPr>
+            <a:r>
+              <a:rPr lang="en-US" dirty="0"/>
+              <a:t>	</a:t>
+            </a:r>
+            <a:r>
+              <a:rPr lang="en-US" dirty="0" smtClean="0"/>
+              <a:t>Google “Github for desktop” and download it</a:t>
+            </a:r>
+          </a:p>
+          <a:p>
+            <a:endParaRPr lang="en-US" dirty="0"/>
+          </a:p>
+          <a:p>
+            <a:r>
+              <a:rPr lang="en-US" dirty="0" smtClean="0"/>
+              <a:t>2 ways to interact w/ </a:t>
+            </a:r>
+            <a:r>
+              <a:rPr lang="en-US" dirty="0" err="1" smtClean="0"/>
+              <a:t>git</a:t>
+            </a:r>
+            <a:r>
+              <a:rPr lang="en-US" dirty="0" smtClean="0"/>
+              <a:t>.</a:t>
+            </a:r>
+          </a:p>
+          <a:p>
+            <a:pPr marL="0" indent="0">
+              <a:buNone/>
+            </a:pPr>
+            <a:r>
+              <a:rPr lang="en-US" dirty="0"/>
+              <a:t>	</a:t>
+            </a:r>
+            <a:r>
+              <a:rPr lang="en-US" dirty="0" smtClean="0"/>
+              <a:t>- command line </a:t>
+            </a:r>
+            <a:r>
+              <a:rPr lang="en-US" dirty="0" smtClean="0">
+                <a:sym typeface="Wingdings"/>
+              </a:rPr>
+              <a:t></a:t>
+            </a:r>
+            <a:endParaRPr lang="en-US" dirty="0" smtClean="0"/>
+          </a:p>
+          <a:p>
+            <a:pPr marL="0" indent="0">
+              <a:buNone/>
+            </a:pPr>
+            <a:r>
+              <a:rPr lang="en-US" dirty="0"/>
+              <a:t>	</a:t>
+            </a:r>
+            <a:r>
+              <a:rPr lang="en-US" dirty="0" smtClean="0"/>
+              <a:t>- GUI </a:t>
+            </a:r>
+            <a:r>
+              <a:rPr lang="en-US" dirty="0" smtClean="0">
+                <a:sym typeface="Wingdings"/>
+              </a:rPr>
+              <a:t></a:t>
+            </a:r>
+            <a:endParaRPr lang="en-US" dirty="0" smtClean="0"/>
+          </a:p>
+        </p:txBody>
+      </p:sp>
+    </p:spTree>
+    <p:extLst>
+      <p:ext uri="{BB962C8B-B14F-4D97-AF65-F5344CB8AC3E}">
+        <p14:creationId xmlns:p14="http://schemas.microsoft.com/office/powerpoint/2010/main" val="3724688725"/>
       </p:ext>
     </p:extLst>
   </p:cSld>
@@ -4531,12 +5048,51 @@
         </p:nvSpPr>
         <p:spPr/>
         <p:txBody>
-          <a:bodyPr/>
-          <a:lstStyle/>
-          <a:p>
-            <a:r>
-              <a:rPr lang="en-US" dirty="0" smtClean="0"/>
-              <a:t>Github is a service that puts </a:t>
+          <a:bodyPr>
+            <a:normAutofit/>
+          </a:bodyPr>
+          <a:lstStyle/>
+          <a:p>
+            <a:r>
+              <a:rPr lang="en-US" dirty="0" err="1"/>
+              <a:t>Git</a:t>
+            </a:r>
+            <a:r>
+              <a:rPr lang="en-US" dirty="0"/>
+              <a:t> is essentially “Track changing” in Word (Thanks </a:t>
+            </a:r>
+            <a:r>
+              <a:rPr lang="en-US" dirty="0" err="1"/>
+              <a:t>Kodjo</a:t>
+            </a:r>
+            <a:r>
+              <a:rPr lang="en-US" dirty="0"/>
+              <a:t>!)</a:t>
+            </a:r>
+          </a:p>
+          <a:p>
+            <a:endParaRPr lang="en-US" dirty="0" smtClean="0"/>
+          </a:p>
+          <a:p>
+            <a:r>
+              <a:rPr lang="en-US" dirty="0" smtClean="0"/>
+              <a:t>Github/</a:t>
+            </a:r>
+            <a:r>
+              <a:rPr lang="en-US" dirty="0" err="1" smtClean="0"/>
+              <a:t>BitBucket</a:t>
+            </a:r>
+            <a:r>
+              <a:rPr lang="en-US" dirty="0" smtClean="0"/>
+              <a:t>/</a:t>
+            </a:r>
+            <a:r>
+              <a:rPr lang="en-US" dirty="0" err="1" smtClean="0"/>
+              <a:t>Gitlabs</a:t>
+            </a:r>
+            <a:r>
+              <a:rPr lang="en-US" dirty="0" smtClean="0"/>
+              <a:t> are collaboration  services that puts “</a:t>
             </a:r>
             <a:r>
               <a:rPr lang="en-US" dirty="0" err="1" smtClean="0"/>
@@ -4544,58 +5100,13 @@
             </a:r>
             <a:r>
               <a:rPr lang="en-US" dirty="0" smtClean="0"/>
-              <a:t> in the cloud. That’s it, totally different from</a:t>
-            </a:r>
-            <a:r>
-              <a:rPr lang="is-IS" dirty="0" smtClean="0"/>
-              <a:t>… git</a:t>
-            </a:r>
-            <a:r>
-              <a:rPr lang="en-US" dirty="0" smtClean="0"/>
-              <a:t> </a:t>
-            </a:r>
-          </a:p>
-          <a:p>
-            <a:endParaRPr lang="en-US" dirty="0"/>
-          </a:p>
-          <a:p>
-            <a:r>
-              <a:rPr lang="en-US" dirty="0" err="1" smtClean="0"/>
-              <a:t>Git</a:t>
-            </a:r>
-            <a:r>
-              <a:rPr lang="en-US" dirty="0" smtClean="0"/>
-              <a:t> is essentially “Track changing” in Word (Thanks </a:t>
-            </a:r>
-            <a:r>
-              <a:rPr lang="en-US" dirty="0" err="1" smtClean="0"/>
-              <a:t>Kodjo</a:t>
-            </a:r>
-            <a:r>
-              <a:rPr lang="en-US" dirty="0" smtClean="0"/>
-              <a:t>!)</a:t>
-            </a:r>
-          </a:p>
-          <a:p>
-            <a:endParaRPr lang="en-US" dirty="0"/>
-          </a:p>
-          <a:p>
-            <a:r>
-              <a:rPr lang="en-US" dirty="0" err="1" smtClean="0"/>
-              <a:t>Github.com</a:t>
-            </a:r>
-            <a:r>
-              <a:rPr lang="en-US" dirty="0" smtClean="0"/>
-              <a:t> stores your </a:t>
-            </a:r>
-            <a:r>
-              <a:rPr lang="en-US" dirty="0" err="1" smtClean="0"/>
-              <a:t>git</a:t>
-            </a:r>
-            <a:r>
-              <a:rPr lang="en-US" dirty="0" smtClean="0"/>
-              <a:t> information for you, and shares it with your team.</a:t>
-            </a:r>
+              <a:t>” in the cloud. </a:t>
+            </a:r>
+          </a:p>
+          <a:p>
+            <a:pPr marL="0" indent="0">
+              <a:buNone/>
+            </a:pPr>
             <a:endParaRPr lang="en-US" dirty="0"/>
           </a:p>
         </p:txBody>
@@ -5079,17 +5590,15 @@
             </a:r>
             <a:r>
               <a:rPr lang="en-US" dirty="0" smtClean="0"/>
-              <a:t> is free though, so FREE!! </a:t>
-            </a:r>
-            <a:r>
-              <a:rPr lang="en-US" dirty="0" err="1" smtClean="0"/>
-              <a:t>Weeee</a:t>
-            </a:r>
-            <a:r>
-              <a:rPr lang="en-US" dirty="0" smtClean="0"/>
-              <a:t> </a:t>
+              <a:t> is free </a:t>
             </a:r>
             <a:endParaRPr lang="en-US" dirty="0"/>
+          </a:p>
+          <a:p>
+            <a:r>
+              <a:rPr lang="en-US" dirty="0" smtClean="0"/>
+              <a:t>Github has a GUI</a:t>
+            </a:r>
           </a:p>
         </p:txBody>
       </p:sp>
@@ -5140,7 +5649,7 @@
           <a:p>
             <a:r>
               <a:rPr lang="en-US" dirty="0" smtClean="0"/>
-              <a:t>Hands on, lets jump in</a:t>
+              <a:t>What’s a repository (aka. Repo)?</a:t>
             </a:r>
             <a:endParaRPr lang="en-US" dirty="0"/>
           </a:p>
@@ -5156,100 +5665,74 @@
             <p:ph idx="1"/>
           </p:nvPr>
         </p:nvSpPr>
-        <p:spPr/>
+        <p:spPr>
+          <a:xfrm>
+            <a:off x="457200" y="1600201"/>
+            <a:ext cx="8229600" cy="2667000"/>
+          </a:xfrm>
+        </p:spPr>
         <p:txBody>
           <a:bodyPr>
-            <a:normAutofit lnSpcReduction="10000"/>
+            <a:normAutofit fontScale="92500" lnSpcReduction="20000"/>
           </a:bodyPr>
           <a:lstStyle/>
           <a:p>
             <a:r>
               <a:rPr lang="en-US" dirty="0" smtClean="0"/>
-              <a:t>Go to </a:t>
-            </a:r>
-            <a:r>
-              <a:rPr lang="en-US" dirty="0" smtClean="0">
-                <a:hlinkClick r:id="rId2"/>
-              </a:rPr>
-              <a:t>www.github.com</a:t>
-            </a:r>
-            <a:r>
-              <a:rPr lang="en-US" dirty="0" smtClean="0"/>
-              <a:t> </a:t>
-            </a:r>
-          </a:p>
-          <a:p>
+              <a:t>A repository is a group of files that make up a code base. </a:t>
+            </a:r>
+          </a:p>
+          <a:p>
+            <a:r>
+              <a:rPr lang="en-US" dirty="0" smtClean="0"/>
+              <a:t>Think of it as a folder on a computer</a:t>
+            </a:r>
+          </a:p>
+          <a:p>
+            <a:r>
+              <a:rPr lang="en-US" dirty="0" smtClean="0"/>
+              <a:t>Private </a:t>
+            </a:r>
+            <a:r>
+              <a:rPr lang="en-US" dirty="0" err="1" smtClean="0"/>
+              <a:t>vs</a:t>
+            </a:r>
+            <a:r>
+              <a:rPr lang="en-US" dirty="0" smtClean="0"/>
+              <a:t> Public. </a:t>
+            </a:r>
+          </a:p>
+          <a:p>
+            <a:pPr lvl="1"/>
+            <a:r>
+              <a:rPr lang="en-US" dirty="0" smtClean="0"/>
+              <a:t>One is private to you and your team only. The other one</a:t>
+            </a:r>
+            <a:r>
+              <a:rPr lang="is-IS" dirty="0" smtClean="0"/>
+              <a:t>….</a:t>
+            </a:r>
             <a:endParaRPr lang="en-US" dirty="0"/>
-          </a:p>
-          <a:p>
-            <a:r>
-              <a:rPr lang="en-US" dirty="0" smtClean="0"/>
-              <a:t>For those using windows,  </a:t>
-            </a:r>
-            <a:r>
-              <a:rPr lang="en-US" dirty="0"/>
-              <a:t>G</a:t>
-            </a:r>
-            <a:r>
-              <a:rPr lang="en-US" dirty="0" smtClean="0"/>
-              <a:t>oogle “Github for desktop” and download it</a:t>
-            </a:r>
-          </a:p>
-          <a:p>
-            <a:endParaRPr lang="en-US" dirty="0"/>
-          </a:p>
-          <a:p>
-            <a:r>
-              <a:rPr lang="en-US" dirty="0" smtClean="0"/>
-              <a:t>2 ways to interact w/ </a:t>
-            </a:r>
-            <a:r>
-              <a:rPr lang="en-US" dirty="0" err="1" smtClean="0"/>
-              <a:t>git</a:t>
-            </a:r>
-            <a:r>
-              <a:rPr lang="en-US" dirty="0" smtClean="0"/>
-              <a:t>.</a:t>
-            </a:r>
-          </a:p>
-          <a:p>
-            <a:pPr marL="0" indent="0">
-              <a:buNone/>
-            </a:pPr>
-            <a:r>
-              <a:rPr lang="en-US" dirty="0"/>
-              <a:t>	</a:t>
-            </a:r>
-            <a:r>
-              <a:rPr lang="en-US" dirty="0" smtClean="0"/>
-              <a:t>- command line</a:t>
-            </a:r>
-          </a:p>
-          <a:p>
-            <a:pPr marL="0" indent="0">
-              <a:buNone/>
-            </a:pPr>
-            <a:r>
-              <a:rPr lang="en-US" dirty="0"/>
-              <a:t>	</a:t>
-            </a:r>
-            <a:r>
-              <a:rPr lang="en-US" dirty="0" smtClean="0"/>
-              <a:t>- GUI </a:t>
-            </a:r>
           </a:p>
         </p:txBody>
       </p:sp>
     </p:spTree>
     <p:extLst>
       <p:ext uri="{BB962C8B-B14F-4D97-AF65-F5344CB8AC3E}">
-        <p14:creationId xmlns:p14="http://schemas.microsoft.com/office/powerpoint/2010/main" val="2475849585"/>
+        <p14:creationId xmlns:p14="http://schemas.microsoft.com/office/powerpoint/2010/main" val="257846433"/>
       </p:ext>
     </p:extLst>
   </p:cSld>
   <p:clrMapOvr>
     <a:masterClrMapping/>
   </p:clrMapOvr>
+  <p:timing>
+    <p:tnLst>
+      <p:par>
+        <p:cTn xmlns:p14="http://schemas.microsoft.com/office/powerpoint/2010/main" id="1" dur="indefinite" restart="never" nodeType="tmRoot"/>
+      </p:par>
+    </p:tnLst>
+  </p:timing>
 </p:sld>
 </file>
 
@@ -5287,127 +5770,6 @@
           <a:p>
             <a:r>
               <a:rPr lang="en-US" dirty="0" smtClean="0"/>
-              <a:t>What’s a repository (aka. Repo)?</a:t>
-            </a:r>
-            <a:endParaRPr lang="en-US" dirty="0"/>
-          </a:p>
-        </p:txBody>
-      </p:sp>
-      <p:sp>
-        <p:nvSpPr>
-          <p:cNvPr id="3" name="Content Placeholder 2"/>
-          <p:cNvSpPr>
-            <a:spLocks noGrp="1"/>
-          </p:cNvSpPr>
-          <p:nvPr>
-            <p:ph idx="1"/>
-          </p:nvPr>
-        </p:nvSpPr>
-        <p:spPr>
-          <a:xfrm>
-            <a:off x="457200" y="1600201"/>
-            <a:ext cx="8229600" cy="2667000"/>
-          </a:xfrm>
-        </p:spPr>
-        <p:txBody>
-          <a:bodyPr>
-            <a:normAutofit fontScale="92500" lnSpcReduction="20000"/>
-          </a:bodyPr>
-          <a:lstStyle/>
-          <a:p>
-            <a:r>
-              <a:rPr lang="en-US" dirty="0" smtClean="0"/>
-              <a:t>A repository is a group of files that make up a code base. </a:t>
-            </a:r>
-          </a:p>
-          <a:p>
-            <a:r>
-              <a:rPr lang="en-US" dirty="0" smtClean="0"/>
-              <a:t>Think of it as a folder on a computer. </a:t>
-            </a:r>
-          </a:p>
-          <a:p>
-            <a:r>
-              <a:rPr lang="en-US" dirty="0" smtClean="0"/>
-              <a:t>Private </a:t>
-            </a:r>
-            <a:r>
-              <a:rPr lang="en-US" dirty="0" err="1" smtClean="0"/>
-              <a:t>vs</a:t>
-            </a:r>
-            <a:r>
-              <a:rPr lang="en-US" dirty="0" smtClean="0"/>
-              <a:t> Public. </a:t>
-            </a:r>
-          </a:p>
-          <a:p>
-            <a:pPr lvl="1"/>
-            <a:r>
-              <a:rPr lang="en-US" dirty="0" smtClean="0"/>
-              <a:t>One is private to you and your team only. The other one</a:t>
-            </a:r>
-            <a:r>
-              <a:rPr lang="is-IS" dirty="0" smtClean="0"/>
-              <a:t>….</a:t>
-            </a:r>
-            <a:endParaRPr lang="en-US" dirty="0"/>
-          </a:p>
-        </p:txBody>
-      </p:sp>
-    </p:spTree>
-    <p:extLst>
-      <p:ext uri="{BB962C8B-B14F-4D97-AF65-F5344CB8AC3E}">
-        <p14:creationId xmlns:p14="http://schemas.microsoft.com/office/powerpoint/2010/main" val="257846433"/>
-      </p:ext>
-    </p:extLst>
-  </p:cSld>
-  <p:clrMapOvr>
-    <a:masterClrMapping/>
-  </p:clrMapOvr>
-  <p:timing>
-    <p:tnLst>
-      <p:par>
-        <p:cTn xmlns:p14="http://schemas.microsoft.com/office/powerpoint/2010/main" id="1" dur="indefinite" restart="never" nodeType="tmRoot"/>
-      </p:par>
-    </p:tnLst>
-  </p:timing>
-</p:sld>
-</file>
-
-<file path=ppt/slides/slide9.xml><?xml version="1.0" encoding="utf-8"?>
-<p:sld xmlns:a="http://schemas.openxmlformats.org/drawingml/2006/main" xmlns:r="http://schemas.openxmlformats.org/officeDocument/2006/relationships" xmlns:p="http://schemas.openxmlformats.org/presentationml/2006/main">
-  <p:cSld>
-    <p:spTree>
-      <p:nvGrpSpPr>
-        <p:cNvPr id="1" name=""/>
-        <p:cNvGrpSpPr/>
-        <p:nvPr/>
-      </p:nvGrpSpPr>
-      <p:grpSpPr>
-        <a:xfrm>
-          <a:off x="0" y="0"/>
-          <a:ext cx="0" cy="0"/>
-          <a:chOff x="0" y="0"/>
-          <a:chExt cx="0" cy="0"/>
-        </a:xfrm>
-      </p:grpSpPr>
-      <p:sp>
-        <p:nvSpPr>
-          <p:cNvPr id="2" name="Title 1"/>
-          <p:cNvSpPr>
-            <a:spLocks noGrp="1"/>
-          </p:cNvSpPr>
-          <p:nvPr>
-            <p:ph type="title"/>
-          </p:nvPr>
-        </p:nvSpPr>
-        <p:spPr/>
-        <p:txBody>
-          <a:bodyPr/>
-          <a:lstStyle/>
-          <a:p>
-            <a:r>
-              <a:rPr lang="en-US" dirty="0" smtClean="0"/>
               <a:t>Basic features/commands</a:t>
             </a:r>
             <a:endParaRPr lang="en-US" dirty="0"/>
@@ -5483,7 +5845,6 @@
               <a:rPr lang="en-US" dirty="0" smtClean="0"/>
               <a:t>)</a:t>
             </a:r>
-            <a:endParaRPr lang="en-US" dirty="0" smtClean="0"/>
           </a:p>
           <a:p>
             <a:r>
@@ -5800,6 +6161,66 @@
       </p:par>
     </p:tnLst>
   </p:timing>
+</p:sld>
+</file>
+
+<file path=ppt/slides/slide9.xml><?xml version="1.0" encoding="utf-8"?>
+<p:sld xmlns:a="http://schemas.openxmlformats.org/drawingml/2006/main" xmlns:r="http://schemas.openxmlformats.org/officeDocument/2006/relationships" xmlns:p="http://schemas.openxmlformats.org/presentationml/2006/main">
+  <p:cSld>
+    <p:spTree>
+      <p:nvGrpSpPr>
+        <p:cNvPr id="1" name=""/>
+        <p:cNvGrpSpPr/>
+        <p:nvPr/>
+      </p:nvGrpSpPr>
+      <p:grpSpPr>
+        <a:xfrm>
+          <a:off x="0" y="0"/>
+          <a:ext cx="0" cy="0"/>
+          <a:chOff x="0" y="0"/>
+          <a:chExt cx="0" cy="0"/>
+        </a:xfrm>
+      </p:grpSpPr>
+      <p:pic>
+        <p:nvPicPr>
+          <p:cNvPr id="6" name="Picture 5" descr="64225164.jpg"/>
+          <p:cNvPicPr>
+            <a:picLocks noChangeAspect="1"/>
+          </p:cNvPicPr>
+          <p:nvPr/>
+        </p:nvPicPr>
+        <p:blipFill>
+          <a:blip r:embed="rId2">
+            <a:extLst>
+              <a:ext uri="{28A0092B-C50C-407E-A947-70E740481C1C}">
+                <a14:useLocalDpi xmlns:a14="http://schemas.microsoft.com/office/drawing/2010/main" val="0"/>
+              </a:ext>
+            </a:extLst>
+          </a:blip>
+          <a:stretch>
+            <a:fillRect/>
+          </a:stretch>
+        </p:blipFill>
+        <p:spPr>
+          <a:xfrm>
+            <a:off x="1950720" y="985520"/>
+            <a:ext cx="5080000" cy="5080000"/>
+          </a:xfrm>
+          <a:prstGeom prst="rect">
+            <a:avLst/>
+          </a:prstGeom>
+        </p:spPr>
+      </p:pic>
+    </p:spTree>
+    <p:extLst>
+      <p:ext uri="{BB962C8B-B14F-4D97-AF65-F5344CB8AC3E}">
+        <p14:creationId xmlns:p14="http://schemas.microsoft.com/office/powerpoint/2010/main" val="126048996"/>
+      </p:ext>
+    </p:extLst>
+  </p:cSld>
+  <p:clrMapOvr>
+    <a:masterClrMapping/>
+  </p:clrMapOvr>
 </p:sld>
 </file>
 

</xml_diff>